<commit_message>
Minor change to slide deck.
</commit_message>
<xml_diff>
--- a/NiklasB/WebAdventure/StateMachine.pptx
+++ b/NiklasB/WebAdventure/StateMachine.pptx
@@ -121,7 +121,16 @@
       </a:defRPr>
     </a:lvl9pPr>
   </p:defaultTextStyle>
+  <p:extLst>
+    <p:ext uri="{EFAFB233-063F-42B5-8137-9DF3F51BA10A}">
+      <p15:sldGuideLst xmlns:p15="http://schemas.microsoft.com/office/powerpoint/2012/main"/>
+    </p:ext>
+  </p:extLst>
 </p:presentation>
+</file>
+
+<file path=ppt/revisionInfo.xml><?xml version="1.0" encoding="utf-8"?>
+<p1510:revInfo xmlns:a="http://schemas.openxmlformats.org/drawingml/2006/main" xmlns:r="http://schemas.openxmlformats.org/officeDocument/2006/relationships" xmlns:p1510="http://schemas.microsoft.com/office/powerpoint/2015/10/main"/>
 </file>
 
 <file path=ppt/notesMasters/notesMaster1.xml><?xml version="1.0" encoding="utf-8"?>
@@ -206,7 +215,7 @@
           <a:p>
             <a:fld id="{0E6BCC00-A57C-4A97-A54D-1B376CC71393}" type="datetimeFigureOut">
               <a:rPr lang="en-US" smtClean="0"/>
-              <a:t>1/17/2018</a:t>
+              <a:t>1/18/2018</a:t>
             </a:fld>
             <a:endParaRPr lang="en-US"/>
           </a:p>
@@ -1880,7 +1889,7 @@
           <a:p>
             <a:fld id="{DB2319FB-0869-42CE-9AFD-B9A82D86A249}" type="datetimeFigureOut">
               <a:rPr lang="en-US" smtClean="0"/>
-              <a:t>1/17/2018</a:t>
+              <a:t>1/18/2018</a:t>
             </a:fld>
             <a:endParaRPr lang="en-US"/>
           </a:p>
@@ -2078,7 +2087,7 @@
           <a:p>
             <a:fld id="{DB2319FB-0869-42CE-9AFD-B9A82D86A249}" type="datetimeFigureOut">
               <a:rPr lang="en-US" smtClean="0"/>
-              <a:t>1/17/2018</a:t>
+              <a:t>1/18/2018</a:t>
             </a:fld>
             <a:endParaRPr lang="en-US"/>
           </a:p>
@@ -2286,7 +2295,7 @@
           <a:p>
             <a:fld id="{DB2319FB-0869-42CE-9AFD-B9A82D86A249}" type="datetimeFigureOut">
               <a:rPr lang="en-US" smtClean="0"/>
-              <a:t>1/17/2018</a:t>
+              <a:t>1/18/2018</a:t>
             </a:fld>
             <a:endParaRPr lang="en-US"/>
           </a:p>
@@ -2484,7 +2493,7 @@
           <a:p>
             <a:fld id="{DB2319FB-0869-42CE-9AFD-B9A82D86A249}" type="datetimeFigureOut">
               <a:rPr lang="en-US" smtClean="0"/>
-              <a:t>1/17/2018</a:t>
+              <a:t>1/18/2018</a:t>
             </a:fld>
             <a:endParaRPr lang="en-US"/>
           </a:p>
@@ -2759,7 +2768,7 @@
           <a:p>
             <a:fld id="{DB2319FB-0869-42CE-9AFD-B9A82D86A249}" type="datetimeFigureOut">
               <a:rPr lang="en-US" smtClean="0"/>
-              <a:t>1/17/2018</a:t>
+              <a:t>1/18/2018</a:t>
             </a:fld>
             <a:endParaRPr lang="en-US"/>
           </a:p>
@@ -3024,7 +3033,7 @@
           <a:p>
             <a:fld id="{DB2319FB-0869-42CE-9AFD-B9A82D86A249}" type="datetimeFigureOut">
               <a:rPr lang="en-US" smtClean="0"/>
-              <a:t>1/17/2018</a:t>
+              <a:t>1/18/2018</a:t>
             </a:fld>
             <a:endParaRPr lang="en-US"/>
           </a:p>
@@ -3436,7 +3445,7 @@
           <a:p>
             <a:fld id="{DB2319FB-0869-42CE-9AFD-B9A82D86A249}" type="datetimeFigureOut">
               <a:rPr lang="en-US" smtClean="0"/>
-              <a:t>1/17/2018</a:t>
+              <a:t>1/18/2018</a:t>
             </a:fld>
             <a:endParaRPr lang="en-US"/>
           </a:p>
@@ -3577,7 +3586,7 @@
           <a:p>
             <a:fld id="{DB2319FB-0869-42CE-9AFD-B9A82D86A249}" type="datetimeFigureOut">
               <a:rPr lang="en-US" smtClean="0"/>
-              <a:t>1/17/2018</a:t>
+              <a:t>1/18/2018</a:t>
             </a:fld>
             <a:endParaRPr lang="en-US"/>
           </a:p>
@@ -3690,7 +3699,7 @@
           <a:p>
             <a:fld id="{DB2319FB-0869-42CE-9AFD-B9A82D86A249}" type="datetimeFigureOut">
               <a:rPr lang="en-US" smtClean="0"/>
-              <a:t>1/17/2018</a:t>
+              <a:t>1/18/2018</a:t>
             </a:fld>
             <a:endParaRPr lang="en-US"/>
           </a:p>
@@ -4001,7 +4010,7 @@
           <a:p>
             <a:fld id="{DB2319FB-0869-42CE-9AFD-B9A82D86A249}" type="datetimeFigureOut">
               <a:rPr lang="en-US" smtClean="0"/>
-              <a:t>1/17/2018</a:t>
+              <a:t>1/18/2018</a:t>
             </a:fld>
             <a:endParaRPr lang="en-US"/>
           </a:p>
@@ -4289,7 +4298,7 @@
           <a:p>
             <a:fld id="{DB2319FB-0869-42CE-9AFD-B9A82D86A249}" type="datetimeFigureOut">
               <a:rPr lang="en-US" smtClean="0"/>
-              <a:t>1/17/2018</a:t>
+              <a:t>1/18/2018</a:t>
             </a:fld>
             <a:endParaRPr lang="en-US"/>
           </a:p>
@@ -4530,7 +4539,7 @@
           <a:p>
             <a:fld id="{DB2319FB-0869-42CE-9AFD-B9A82D86A249}" type="datetimeFigureOut">
               <a:rPr lang="en-US" smtClean="0"/>
-              <a:t>1/17/2018</a:t>
+              <a:t>1/18/2018</a:t>
             </a:fld>
             <a:endParaRPr lang="en-US"/>
           </a:p>
@@ -7075,7 +7084,9 @@
         </p:nvSpPr>
         <p:spPr/>
         <p:txBody>
-          <a:bodyPr/>
+          <a:bodyPr>
+            <a:normAutofit/>
+          </a:bodyPr>
           <a:lstStyle/>
           <a:p>
             <a:r>
@@ -7102,6 +7113,12 @@
             <a:r>
               <a:rPr lang="en-US" dirty="0"/>
               <a:t>Which link is taken at each step depends on the user’s choice</a:t>
+            </a:r>
+          </a:p>
+          <a:p>
+            <a:r>
+              <a:rPr lang="en-US" dirty="0"/>
+              <a:t>How would we implement something like this in C#?</a:t>
             </a:r>
           </a:p>
         </p:txBody>

</xml_diff>

<commit_message>
Improvements to PowerPoint slides
</commit_message>
<xml_diff>
--- a/NiklasB/WebAdventure/StateMachine.pptx
+++ b/NiklasB/WebAdventure/StateMachine.pptx
@@ -11,8 +11,8 @@
     <p:sldId id="256" r:id="rId2"/>
     <p:sldId id="257" r:id="rId3"/>
     <p:sldId id="258" r:id="rId4"/>
-    <p:sldId id="259" r:id="rId5"/>
-    <p:sldId id="260" r:id="rId6"/>
+    <p:sldId id="271" r:id="rId5"/>
+    <p:sldId id="272" r:id="rId6"/>
     <p:sldId id="261" r:id="rId7"/>
     <p:sldId id="262" r:id="rId8"/>
     <p:sldId id="263" r:id="rId9"/>
@@ -1312,7 +1312,7 @@
     </p:spTree>
     <p:extLst>
       <p:ext uri="{BB962C8B-B14F-4D97-AF65-F5344CB8AC3E}">
-        <p14:creationId xmlns:p14="http://schemas.microsoft.com/office/powerpoint/2010/main" val="731048116"/>
+        <p14:creationId xmlns:p14="http://schemas.microsoft.com/office/powerpoint/2010/main" val="980036910"/>
       </p:ext>
     </p:extLst>
   </p:cSld>
@@ -1396,7 +1396,7 @@
     </p:spTree>
     <p:extLst>
       <p:ext uri="{BB962C8B-B14F-4D97-AF65-F5344CB8AC3E}">
-        <p14:creationId xmlns:p14="http://schemas.microsoft.com/office/powerpoint/2010/main" val="2332335520"/>
+        <p14:creationId xmlns:p14="http://schemas.microsoft.com/office/powerpoint/2010/main" val="2285808451"/>
       </p:ext>
     </p:extLst>
   </p:cSld>
@@ -7085,7 +7085,7 @@
         <p:spPr/>
         <p:txBody>
           <a:bodyPr>
-            <a:normAutofit/>
+            <a:normAutofit lnSpcReduction="10000"/>
           </a:bodyPr>
           <a:lstStyle/>
           <a:p>
@@ -7098,21 +7098,37 @@
             <a:endParaRPr lang="en-US" dirty="0"/>
           </a:p>
           <a:p>
+            <a:pPr lvl="1"/>
             <a:r>
               <a:rPr lang="en-US" dirty="0"/>
               <a:t>The story is broken into pages</a:t>
             </a:r>
           </a:p>
           <a:p>
+            <a:pPr lvl="1"/>
             <a:r>
               <a:rPr lang="en-US" dirty="0"/>
-              <a:t>Links between pages define possible routes through the story</a:t>
+              <a:t>Available choices in each page are represented as links</a:t>
             </a:r>
           </a:p>
           <a:p>
             <a:r>
               <a:rPr lang="en-US" dirty="0"/>
-              <a:t>Which link is taken at each step depends on the user’s choice</a:t>
+              <a:t>Simplified story diagram (right)</a:t>
+            </a:r>
+          </a:p>
+          <a:p>
+            <a:pPr lvl="1"/>
+            <a:r>
+              <a:rPr lang="en-US" dirty="0"/>
+              <a:t>Each circle represents a specific point in the story</a:t>
+            </a:r>
+          </a:p>
+          <a:p>
+            <a:pPr lvl="1"/>
+            <a:r>
+              <a:rPr lang="en-US" dirty="0"/>
+              <a:t>Each possible choice (arrow) takes you to another pre-defined point in the story</a:t>
             </a:r>
           </a:p>
           <a:p>
@@ -7930,10 +7946,15 @@
             <p:ph sz="half" idx="1"/>
           </p:nvPr>
         </p:nvSpPr>
-        <p:spPr/>
+        <p:spPr>
+          <a:xfrm>
+            <a:off x="3804401" y="1690688"/>
+            <a:ext cx="2199080" cy="4597910"/>
+          </a:xfrm>
+        </p:spPr>
         <p:txBody>
           <a:bodyPr>
-            <a:normAutofit fontScale="85000" lnSpcReduction="20000"/>
+            <a:normAutofit/>
           </a:bodyPr>
           <a:lstStyle/>
           <a:p>
@@ -7941,7 +7962,7 @@
               <a:buNone/>
             </a:pPr>
             <a:r>
-              <a:rPr lang="en-US" sz="1800" dirty="0">
+              <a:rPr lang="en-US" sz="1400" dirty="0">
                 <a:latin typeface="Consolas" panose="020B0609020204030204" pitchFamily="49" charset="0"/>
               </a:rPr>
               <a:t>A();</a:t>
@@ -7952,10 +7973,10 @@
               <a:buNone/>
             </a:pPr>
             <a:r>
-              <a:rPr lang="en-US" sz="1800" dirty="0">
-                <a:latin typeface="Consolas" panose="020B0609020204030204" pitchFamily="49" charset="0"/>
-              </a:rPr>
-              <a:t>if (1) {</a:t>
+              <a:rPr lang="en-US" sz="1400" dirty="0">
+                <a:latin typeface="Consolas" panose="020B0609020204030204" pitchFamily="49" charset="0"/>
+              </a:rPr>
+              <a:t>if (1)</a:t>
             </a:r>
           </a:p>
           <a:p>
@@ -7963,7 +7984,18 @@
               <a:buNone/>
             </a:pPr>
             <a:r>
-              <a:rPr lang="en-US" sz="1800" dirty="0">
+              <a:rPr lang="en-US" sz="1400" dirty="0">
+                <a:latin typeface="Consolas" panose="020B0609020204030204" pitchFamily="49" charset="0"/>
+              </a:rPr>
+              <a:t>{</a:t>
+            </a:r>
+          </a:p>
+          <a:p>
+            <a:pPr marL="0" indent="0">
+              <a:buNone/>
+            </a:pPr>
+            <a:r>
+              <a:rPr lang="en-US" sz="1400" dirty="0">
                 <a:latin typeface="Consolas" panose="020B0609020204030204" pitchFamily="49" charset="0"/>
               </a:rPr>
               <a:t>    B();</a:t>
@@ -7974,10 +8006,10 @@
               <a:buNone/>
             </a:pPr>
             <a:r>
-              <a:rPr lang="en-US" sz="1800" dirty="0">
-                <a:latin typeface="Consolas" panose="020B0609020204030204" pitchFamily="49" charset="0"/>
-              </a:rPr>
-              <a:t>    if (1)</a:t>
+              <a:rPr lang="en-US" sz="1400" dirty="0">
+                <a:latin typeface="Consolas" panose="020B0609020204030204" pitchFamily="49" charset="0"/>
+              </a:rPr>
+              <a:t>    if (1) </a:t>
             </a:r>
           </a:p>
           <a:p>
@@ -7985,7 +8017,18 @@
               <a:buNone/>
             </a:pPr>
             <a:r>
-              <a:rPr lang="en-US" sz="1800" dirty="0">
+              <a:rPr lang="en-US" sz="1400" dirty="0">
+                <a:latin typeface="Consolas" panose="020B0609020204030204" pitchFamily="49" charset="0"/>
+              </a:rPr>
+              <a:t>    {</a:t>
+            </a:r>
+          </a:p>
+          <a:p>
+            <a:pPr marL="0" indent="0">
+              <a:buNone/>
+            </a:pPr>
+            <a:r>
+              <a:rPr lang="en-US" sz="1400" dirty="0">
                 <a:latin typeface="Consolas" panose="020B0609020204030204" pitchFamily="49" charset="0"/>
               </a:rPr>
               <a:t>        D();</a:t>
@@ -7996,7 +8039,18 @@
               <a:buNone/>
             </a:pPr>
             <a:r>
-              <a:rPr lang="en-US" sz="1800" dirty="0">
+              <a:rPr lang="en-US" sz="1400" dirty="0">
+                <a:latin typeface="Consolas" panose="020B0609020204030204" pitchFamily="49" charset="0"/>
+              </a:rPr>
+              <a:t>    }</a:t>
+            </a:r>
+          </a:p>
+          <a:p>
+            <a:pPr marL="0" indent="0">
+              <a:buNone/>
+            </a:pPr>
+            <a:r>
+              <a:rPr lang="en-US" sz="1400" dirty="0">
                 <a:latin typeface="Consolas" panose="020B0609020204030204" pitchFamily="49" charset="0"/>
               </a:rPr>
               <a:t>}</a:t>
@@ -8007,10 +8061,10 @@
               <a:buNone/>
             </a:pPr>
             <a:r>
-              <a:rPr lang="en-US" sz="1800" dirty="0">
-                <a:latin typeface="Consolas" panose="020B0609020204030204" pitchFamily="49" charset="0"/>
-              </a:rPr>
-              <a:t>else if (2) {</a:t>
+              <a:rPr lang="en-US" sz="1400" dirty="0">
+                <a:latin typeface="Consolas" panose="020B0609020204030204" pitchFamily="49" charset="0"/>
+              </a:rPr>
+              <a:t>else if (2) </a:t>
             </a:r>
           </a:p>
           <a:p>
@@ -8018,10 +8072,10 @@
               <a:buNone/>
             </a:pPr>
             <a:r>
-              <a:rPr lang="en-US" sz="1800" dirty="0">
-                <a:latin typeface="Consolas" panose="020B0609020204030204" pitchFamily="49" charset="0"/>
-              </a:rPr>
-              <a:t>    C();</a:t>
+              <a:rPr lang="en-US" sz="1400" dirty="0">
+                <a:latin typeface="Consolas" panose="020B0609020204030204" pitchFamily="49" charset="0"/>
+              </a:rPr>
+              <a:t>{</a:t>
             </a:r>
           </a:p>
           <a:p>
@@ -8029,10 +8083,10 @@
               <a:buNone/>
             </a:pPr>
             <a:r>
-              <a:rPr lang="en-US" sz="1800" dirty="0">
-                <a:latin typeface="Consolas" panose="020B0609020204030204" pitchFamily="49" charset="0"/>
-              </a:rPr>
-              <a:t>    if (1) {</a:t>
+              <a:rPr lang="en-US" sz="1400" dirty="0">
+                <a:latin typeface="Consolas" panose="020B0609020204030204" pitchFamily="49" charset="0"/>
+              </a:rPr>
+              <a:t>   . . .</a:t>
             </a:r>
           </a:p>
           <a:p>
@@ -8040,62 +8094,7 @@
               <a:buNone/>
             </a:pPr>
             <a:r>
-              <a:rPr lang="en-US" sz="1800" dirty="0">
-                <a:latin typeface="Consolas" panose="020B0609020204030204" pitchFamily="49" charset="0"/>
-              </a:rPr>
-              <a:t>        E();</a:t>
-            </a:r>
-          </a:p>
-          <a:p>
-            <a:pPr marL="0" indent="0">
-              <a:buNone/>
-            </a:pPr>
-            <a:r>
-              <a:rPr lang="en-US" sz="1800" dirty="0">
-                <a:latin typeface="Consolas" panose="020B0609020204030204" pitchFamily="49" charset="0"/>
-              </a:rPr>
-              <a:t>    }</a:t>
-            </a:r>
-          </a:p>
-          <a:p>
-            <a:pPr marL="0" indent="0">
-              <a:buNone/>
-            </a:pPr>
-            <a:r>
-              <a:rPr lang="en-US" sz="1800" dirty="0">
-                <a:latin typeface="Consolas" panose="020B0609020204030204" pitchFamily="49" charset="0"/>
-              </a:rPr>
-              <a:t>    else if (2) {</a:t>
-            </a:r>
-          </a:p>
-          <a:p>
-            <a:pPr marL="0" indent="0">
-              <a:buNone/>
-            </a:pPr>
-            <a:r>
-              <a:rPr lang="en-US" sz="1800" dirty="0">
-                <a:latin typeface="Consolas" panose="020B0609020204030204" pitchFamily="49" charset="0"/>
-              </a:rPr>
-              <a:t>        F();</a:t>
-            </a:r>
-          </a:p>
-          <a:p>
-            <a:pPr marL="0" indent="0">
-              <a:buNone/>
-            </a:pPr>
-            <a:r>
-              <a:rPr lang="en-US" sz="1800" dirty="0">
-                <a:latin typeface="Consolas" panose="020B0609020204030204" pitchFamily="49" charset="0"/>
-              </a:rPr>
-              <a:t>    }</a:t>
-            </a:r>
-          </a:p>
-          <a:p>
-            <a:pPr marL="0" indent="0">
-              <a:buNone/>
-            </a:pPr>
-            <a:r>
-              <a:rPr lang="en-US" sz="1800" dirty="0">
+              <a:rPr lang="en-US" sz="1400" dirty="0">
                 <a:latin typeface="Consolas" panose="020B0609020204030204" pitchFamily="49" charset="0"/>
               </a:rPr>
               <a:t>}</a:t>
@@ -8850,8 +8849,8 @@
         </p:nvSpPr>
         <p:spPr>
           <a:xfrm>
-            <a:off x="3313786" y="2567635"/>
-            <a:ext cx="2194560" cy="1594714"/>
+            <a:off x="5344412" y="3072611"/>
+            <a:ext cx="1627377" cy="1080644"/>
           </a:xfrm>
           <a:prstGeom prst="leftArrow">
             <a:avLst/>
@@ -8879,8 +8878,74 @@
           <a:p>
             <a:pPr algn="ctr"/>
             <a:r>
-              <a:rPr lang="en-US" dirty="0"/>
+              <a:rPr lang="en-US" sz="1600" dirty="0"/>
               <a:t>Pseudo code</a:t>
+            </a:r>
+          </a:p>
+        </p:txBody>
+      </p:sp>
+      <p:sp>
+        <p:nvSpPr>
+          <p:cNvPr id="11" name="Rectangle 10">
+            <a:extLst>
+              <a:ext uri="{FF2B5EF4-FFF2-40B4-BE49-F238E27FC236}">
+                <a16:creationId xmlns:a16="http://schemas.microsoft.com/office/drawing/2014/main" id="{20055DD4-067B-45C8-BF77-E8D26336E32A}"/>
+              </a:ext>
+            </a:extLst>
+          </p:cNvPr>
+          <p:cNvSpPr/>
+          <p:nvPr/>
+        </p:nvSpPr>
+        <p:spPr>
+          <a:xfrm>
+            <a:off x="879971" y="1611008"/>
+            <a:ext cx="2632737" cy="2923205"/>
+          </a:xfrm>
+          <a:prstGeom prst="rect">
+            <a:avLst/>
+          </a:prstGeom>
+        </p:spPr>
+        <p:style>
+          <a:lnRef idx="2">
+            <a:schemeClr val="accent2">
+              <a:shade val="50000"/>
+            </a:schemeClr>
+          </a:lnRef>
+          <a:fillRef idx="1">
+            <a:schemeClr val="accent2"/>
+          </a:fillRef>
+          <a:effectRef idx="0">
+            <a:schemeClr val="accent2"/>
+          </a:effectRef>
+          <a:fontRef idx="minor">
+            <a:schemeClr val="lt1"/>
+          </a:fontRef>
+        </p:style>
+        <p:txBody>
+          <a:bodyPr rtlCol="0" anchor="ctr"/>
+          <a:lstStyle/>
+          <a:p>
+            <a:r>
+              <a:rPr lang="en-US" sz="1400" dirty="0"/>
+              <a:t>We can think of the diagram as a decision tree, with each choice leading to more choices.</a:t>
+            </a:r>
+          </a:p>
+          <a:p>
+            <a:endParaRPr lang="en-US" sz="1400" dirty="0"/>
+          </a:p>
+          <a:p>
+            <a:r>
+              <a:rPr lang="en-US" sz="1400" dirty="0"/>
+              <a:t>In code, each choice corresponds to an “if” or “else if” statement, followed by a block with its own choices.</a:t>
+            </a:r>
+          </a:p>
+          <a:p>
+            <a:endParaRPr lang="en-US" sz="1400" dirty="0"/>
+          </a:p>
+          <a:p>
+            <a:r>
+              <a:rPr lang="en-US" sz="1400" dirty="0"/>
+              <a:t>The hierarchy of nested blocks mirrors the hierarchy of nested tree.</a:t>
             </a:r>
           </a:p>
         </p:txBody>
@@ -8938,7 +9003,7 @@
           <a:p>
             <a:r>
               <a:rPr lang="en-US" dirty="0"/>
-              <a:t>Nested if statements, cont.</a:t>
+              <a:t>One approach: Nested if statements, cont.</a:t>
             </a:r>
           </a:p>
         </p:txBody>
@@ -8959,39 +9024,159 @@
             <p:ph sz="half" idx="1"/>
           </p:nvPr>
         </p:nvSpPr>
-        <p:spPr/>
-        <p:txBody>
-          <a:bodyPr/>
-          <a:lstStyle/>
-          <a:p>
-            <a:r>
-              <a:rPr lang="en-US" dirty="0"/>
-              <a:t>The tree-like structure of the diagram is reflected in the code</a:t>
-            </a:r>
-          </a:p>
-          <a:p>
-            <a:r>
-              <a:rPr lang="en-US" dirty="0"/>
-              <a:t>Only works if the diagram has a tree structure</a:t>
-            </a:r>
-          </a:p>
-          <a:p>
-            <a:pPr lvl="1"/>
-            <a:r>
-              <a:rPr lang="en-US" dirty="0"/>
-              <a:t>Each node has only one node that points to it (its parent)</a:t>
-            </a:r>
-          </a:p>
-          <a:p>
-            <a:pPr lvl="1"/>
-            <a:r>
-              <a:rPr lang="en-US" dirty="0"/>
-              <a:t>No node points to the root (A)</a:t>
-            </a:r>
-          </a:p>
-          <a:p>
-            <a:pPr lvl="1"/>
-            <a:endParaRPr lang="en-US" dirty="0"/>
+        <p:spPr>
+          <a:xfrm>
+            <a:off x="3804401" y="1690688"/>
+            <a:ext cx="2199080" cy="4597910"/>
+          </a:xfrm>
+        </p:spPr>
+        <p:txBody>
+          <a:bodyPr>
+            <a:normAutofit/>
+          </a:bodyPr>
+          <a:lstStyle/>
+          <a:p>
+            <a:pPr marL="0" indent="0">
+              <a:buNone/>
+            </a:pPr>
+            <a:r>
+              <a:rPr lang="en-US" sz="1400" dirty="0">
+                <a:latin typeface="Consolas" panose="020B0609020204030204" pitchFamily="49" charset="0"/>
+              </a:rPr>
+              <a:t>A();</a:t>
+            </a:r>
+          </a:p>
+          <a:p>
+            <a:pPr marL="0" indent="0">
+              <a:buNone/>
+            </a:pPr>
+            <a:r>
+              <a:rPr lang="en-US" sz="1400" dirty="0">
+                <a:latin typeface="Consolas" panose="020B0609020204030204" pitchFamily="49" charset="0"/>
+              </a:rPr>
+              <a:t>if (1)</a:t>
+            </a:r>
+          </a:p>
+          <a:p>
+            <a:pPr marL="0" indent="0">
+              <a:buNone/>
+            </a:pPr>
+            <a:r>
+              <a:rPr lang="en-US" sz="1400" dirty="0">
+                <a:latin typeface="Consolas" panose="020B0609020204030204" pitchFamily="49" charset="0"/>
+              </a:rPr>
+              <a:t>{</a:t>
+            </a:r>
+          </a:p>
+          <a:p>
+            <a:pPr marL="0" indent="0">
+              <a:buNone/>
+            </a:pPr>
+            <a:r>
+              <a:rPr lang="en-US" sz="1400" dirty="0">
+                <a:latin typeface="Consolas" panose="020B0609020204030204" pitchFamily="49" charset="0"/>
+              </a:rPr>
+              <a:t>    B();</a:t>
+            </a:r>
+          </a:p>
+          <a:p>
+            <a:pPr marL="0" indent="0">
+              <a:buNone/>
+            </a:pPr>
+            <a:r>
+              <a:rPr lang="en-US" sz="1400" dirty="0">
+                <a:latin typeface="Consolas" panose="020B0609020204030204" pitchFamily="49" charset="0"/>
+              </a:rPr>
+              <a:t>    if (1) </a:t>
+            </a:r>
+          </a:p>
+          <a:p>
+            <a:pPr marL="0" indent="0">
+              <a:buNone/>
+            </a:pPr>
+            <a:r>
+              <a:rPr lang="en-US" sz="1400" dirty="0">
+                <a:latin typeface="Consolas" panose="020B0609020204030204" pitchFamily="49" charset="0"/>
+              </a:rPr>
+              <a:t>    {</a:t>
+            </a:r>
+          </a:p>
+          <a:p>
+            <a:pPr marL="0" indent="0">
+              <a:buNone/>
+            </a:pPr>
+            <a:r>
+              <a:rPr lang="en-US" sz="1400" dirty="0">
+                <a:latin typeface="Consolas" panose="020B0609020204030204" pitchFamily="49" charset="0"/>
+              </a:rPr>
+              <a:t>        D();</a:t>
+            </a:r>
+          </a:p>
+          <a:p>
+            <a:pPr marL="0" indent="0">
+              <a:buNone/>
+            </a:pPr>
+            <a:r>
+              <a:rPr lang="en-US" sz="1400" dirty="0">
+                <a:latin typeface="Consolas" panose="020B0609020204030204" pitchFamily="49" charset="0"/>
+              </a:rPr>
+              <a:t>    }</a:t>
+            </a:r>
+          </a:p>
+          <a:p>
+            <a:pPr marL="0" indent="0">
+              <a:buNone/>
+            </a:pPr>
+            <a:r>
+              <a:rPr lang="en-US" sz="1400" dirty="0">
+                <a:latin typeface="Consolas" panose="020B0609020204030204" pitchFamily="49" charset="0"/>
+              </a:rPr>
+              <a:t>}</a:t>
+            </a:r>
+          </a:p>
+          <a:p>
+            <a:pPr marL="0" indent="0">
+              <a:buNone/>
+            </a:pPr>
+            <a:r>
+              <a:rPr lang="en-US" sz="1400" dirty="0">
+                <a:latin typeface="Consolas" panose="020B0609020204030204" pitchFamily="49" charset="0"/>
+              </a:rPr>
+              <a:t>else if (2) </a:t>
+            </a:r>
+          </a:p>
+          <a:p>
+            <a:pPr marL="0" indent="0">
+              <a:buNone/>
+            </a:pPr>
+            <a:r>
+              <a:rPr lang="en-US" sz="1400" dirty="0">
+                <a:latin typeface="Consolas" panose="020B0609020204030204" pitchFamily="49" charset="0"/>
+              </a:rPr>
+              <a:t>{</a:t>
+            </a:r>
+          </a:p>
+          <a:p>
+            <a:pPr marL="0" indent="0">
+              <a:buNone/>
+            </a:pPr>
+            <a:r>
+              <a:rPr lang="en-US" sz="1400" dirty="0">
+                <a:latin typeface="Consolas" panose="020B0609020204030204" pitchFamily="49" charset="0"/>
+              </a:rPr>
+              <a:t>   . . .</a:t>
+            </a:r>
+          </a:p>
+          <a:p>
+            <a:pPr marL="0" indent="0">
+              <a:buNone/>
+            </a:pPr>
+            <a:r>
+              <a:rPr lang="en-US" sz="1400" dirty="0">
+                <a:latin typeface="Consolas" panose="020B0609020204030204" pitchFamily="49" charset="0"/>
+              </a:rPr>
+              <a:t>}</a:t>
+            </a:r>
           </a:p>
         </p:txBody>
       </p:sp>
@@ -9728,10 +9913,125 @@
           </a:p>
         </p:txBody>
       </p:sp>
+      <p:sp>
+        <p:nvSpPr>
+          <p:cNvPr id="4" name="Arrow: Left 3">
+            <a:extLst>
+              <a:ext uri="{FF2B5EF4-FFF2-40B4-BE49-F238E27FC236}">
+                <a16:creationId xmlns:a16="http://schemas.microsoft.com/office/drawing/2014/main" id="{A6FFE67B-DCEC-452E-9572-D4800CEFE9C3}"/>
+              </a:ext>
+            </a:extLst>
+          </p:cNvPr>
+          <p:cNvSpPr/>
+          <p:nvPr/>
+        </p:nvSpPr>
+        <p:spPr>
+          <a:xfrm>
+            <a:off x="5344412" y="3072611"/>
+            <a:ext cx="1627377" cy="1080644"/>
+          </a:xfrm>
+          <a:prstGeom prst="leftArrow">
+            <a:avLst/>
+          </a:prstGeom>
+        </p:spPr>
+        <p:style>
+          <a:lnRef idx="2">
+            <a:schemeClr val="accent1">
+              <a:shade val="50000"/>
+            </a:schemeClr>
+          </a:lnRef>
+          <a:fillRef idx="1">
+            <a:schemeClr val="accent1"/>
+          </a:fillRef>
+          <a:effectRef idx="0">
+            <a:schemeClr val="accent1"/>
+          </a:effectRef>
+          <a:fontRef idx="minor">
+            <a:schemeClr val="lt1"/>
+          </a:fontRef>
+        </p:style>
+        <p:txBody>
+          <a:bodyPr rtlCol="0" anchor="ctr"/>
+          <a:lstStyle/>
+          <a:p>
+            <a:pPr algn="ctr"/>
+            <a:r>
+              <a:rPr lang="en-US" sz="1600" dirty="0"/>
+              <a:t>Pseudo code</a:t>
+            </a:r>
+          </a:p>
+        </p:txBody>
+      </p:sp>
+      <p:sp>
+        <p:nvSpPr>
+          <p:cNvPr id="11" name="Rectangle 10">
+            <a:extLst>
+              <a:ext uri="{FF2B5EF4-FFF2-40B4-BE49-F238E27FC236}">
+                <a16:creationId xmlns:a16="http://schemas.microsoft.com/office/drawing/2014/main" id="{20055DD4-067B-45C8-BF77-E8D26336E32A}"/>
+              </a:ext>
+            </a:extLst>
+          </p:cNvPr>
+          <p:cNvSpPr/>
+          <p:nvPr/>
+        </p:nvSpPr>
+        <p:spPr>
+          <a:xfrm>
+            <a:off x="902526" y="2616280"/>
+            <a:ext cx="2632737" cy="2923205"/>
+          </a:xfrm>
+          <a:prstGeom prst="rect">
+            <a:avLst/>
+          </a:prstGeom>
+        </p:spPr>
+        <p:style>
+          <a:lnRef idx="2">
+            <a:schemeClr val="accent2">
+              <a:shade val="50000"/>
+            </a:schemeClr>
+          </a:lnRef>
+          <a:fillRef idx="1">
+            <a:schemeClr val="accent2"/>
+          </a:fillRef>
+          <a:effectRef idx="0">
+            <a:schemeClr val="accent2"/>
+          </a:effectRef>
+          <a:fontRef idx="minor">
+            <a:schemeClr val="lt1"/>
+          </a:fontRef>
+        </p:style>
+        <p:txBody>
+          <a:bodyPr rtlCol="0" anchor="ctr"/>
+          <a:lstStyle/>
+          <a:p>
+            <a:r>
+              <a:rPr lang="en-US" sz="1400" dirty="0"/>
+              <a:t>This approach only works if the diagram is a tree.</a:t>
+            </a:r>
+          </a:p>
+          <a:p>
+            <a:endParaRPr lang="en-US" sz="1400" dirty="0"/>
+          </a:p>
+          <a:p>
+            <a:r>
+              <a:rPr lang="en-US" sz="1400" dirty="0"/>
+              <a:t>This means each node has only one node that points to it (its parent), and no node points to the root.</a:t>
+            </a:r>
+          </a:p>
+          <a:p>
+            <a:endParaRPr lang="en-US" sz="1400" dirty="0"/>
+          </a:p>
+          <a:p>
+            <a:r>
+              <a:rPr lang="en-US" sz="1400" dirty="0"/>
+              <a:t>It follows that there is only one path to each point in the story, and no loops or cycles.</a:t>
+            </a:r>
+          </a:p>
+        </p:txBody>
+      </p:sp>
     </p:spTree>
     <p:extLst>
       <p:ext uri="{BB962C8B-B14F-4D97-AF65-F5344CB8AC3E}">
-        <p14:creationId xmlns:p14="http://schemas.microsoft.com/office/powerpoint/2010/main" val="1066348359"/>
+        <p14:creationId xmlns:p14="http://schemas.microsoft.com/office/powerpoint/2010/main" val="2808948314"/>
       </p:ext>
     </p:extLst>
   </p:cSld>
@@ -9781,7 +10081,7 @@
           <a:p>
             <a:r>
               <a:rPr lang="en-US" dirty="0"/>
-              <a:t>Nested if statements, cont.</a:t>
+              <a:t>One approach: Nested if statements, cont.</a:t>
             </a:r>
           </a:p>
         </p:txBody>
@@ -9802,10 +10102,15 @@
             <p:ph sz="half" idx="1"/>
           </p:nvPr>
         </p:nvSpPr>
-        <p:spPr/>
+        <p:spPr>
+          <a:xfrm>
+            <a:off x="3804401" y="1690688"/>
+            <a:ext cx="2199080" cy="4755548"/>
+          </a:xfrm>
+        </p:spPr>
         <p:txBody>
           <a:bodyPr>
-            <a:normAutofit/>
+            <a:noAutofit/>
           </a:bodyPr>
           <a:lstStyle/>
           <a:p>
@@ -9813,7 +10118,7 @@
               <a:buNone/>
             </a:pPr>
             <a:r>
-              <a:rPr lang="en-US" sz="1800" dirty="0">
+              <a:rPr lang="en-US" sz="1400" dirty="0">
                 <a:latin typeface="Consolas" panose="020B0609020204030204" pitchFamily="49" charset="0"/>
               </a:rPr>
               <a:t>A();</a:t>
@@ -9824,10 +10129,10 @@
               <a:buNone/>
             </a:pPr>
             <a:r>
-              <a:rPr lang="en-US" sz="1800" dirty="0">
-                <a:latin typeface="Consolas" panose="020B0609020204030204" pitchFamily="49" charset="0"/>
-              </a:rPr>
-              <a:t>if (1) {</a:t>
+              <a:rPr lang="en-US" sz="1400" dirty="0">
+                <a:latin typeface="Consolas" panose="020B0609020204030204" pitchFamily="49" charset="0"/>
+              </a:rPr>
+              <a:t>if (1)</a:t>
             </a:r>
           </a:p>
           <a:p>
@@ -9835,7 +10140,18 @@
               <a:buNone/>
             </a:pPr>
             <a:r>
-              <a:rPr lang="en-US" sz="1800" dirty="0">
+              <a:rPr lang="en-US" sz="1400" dirty="0">
+                <a:latin typeface="Consolas" panose="020B0609020204030204" pitchFamily="49" charset="0"/>
+              </a:rPr>
+              <a:t>{</a:t>
+            </a:r>
+          </a:p>
+          <a:p>
+            <a:pPr marL="0" indent="0">
+              <a:buNone/>
+            </a:pPr>
+            <a:r>
+              <a:rPr lang="en-US" sz="1400" dirty="0">
                 <a:latin typeface="Consolas" panose="020B0609020204030204" pitchFamily="49" charset="0"/>
               </a:rPr>
               <a:t>    B();</a:t>
@@ -9846,10 +10162,10 @@
               <a:buNone/>
             </a:pPr>
             <a:r>
-              <a:rPr lang="en-US" sz="1800" dirty="0">
-                <a:latin typeface="Consolas" panose="020B0609020204030204" pitchFamily="49" charset="0"/>
-              </a:rPr>
-              <a:t>    if (1)</a:t>
+              <a:rPr lang="en-US" sz="1400" dirty="0">
+                <a:latin typeface="Consolas" panose="020B0609020204030204" pitchFamily="49" charset="0"/>
+              </a:rPr>
+              <a:t>    if (1) </a:t>
             </a:r>
           </a:p>
           <a:p>
@@ -9857,7 +10173,18 @@
               <a:buNone/>
             </a:pPr>
             <a:r>
-              <a:rPr lang="en-US" sz="1800" dirty="0">
+              <a:rPr lang="en-US" sz="1400" dirty="0">
+                <a:latin typeface="Consolas" panose="020B0609020204030204" pitchFamily="49" charset="0"/>
+              </a:rPr>
+              <a:t>    {</a:t>
+            </a:r>
+          </a:p>
+          <a:p>
+            <a:pPr marL="0" indent="0">
+              <a:buNone/>
+            </a:pPr>
+            <a:r>
+              <a:rPr lang="en-US" sz="1400" dirty="0">
                 <a:latin typeface="Consolas" panose="020B0609020204030204" pitchFamily="49" charset="0"/>
               </a:rPr>
               <a:t>        D();</a:t>
@@ -9868,7 +10195,18 @@
               <a:buNone/>
             </a:pPr>
             <a:r>
-              <a:rPr lang="en-US" sz="1800" dirty="0">
+              <a:rPr lang="en-US" sz="1400" dirty="0">
+                <a:latin typeface="Consolas" panose="020B0609020204030204" pitchFamily="49" charset="0"/>
+              </a:rPr>
+              <a:t>    }</a:t>
+            </a:r>
+          </a:p>
+          <a:p>
+            <a:pPr marL="0" indent="0">
+              <a:buNone/>
+            </a:pPr>
+            <a:r>
+              <a:rPr lang="en-US" sz="1400" dirty="0">
                 <a:latin typeface="Consolas" panose="020B0609020204030204" pitchFamily="49" charset="0"/>
               </a:rPr>
               <a:t>    else if (2)</a:t>
@@ -9879,19 +10217,24 @@
               <a:buNone/>
             </a:pPr>
             <a:r>
-              <a:rPr lang="en-US" sz="1800" dirty="0">
-                <a:latin typeface="Consolas" panose="020B0609020204030204" pitchFamily="49" charset="0"/>
-              </a:rPr>
-              <a:t>        </a:t>
-            </a:r>
-            <a:r>
-              <a:rPr lang="en-US" sz="1800" dirty="0">
+              <a:rPr lang="en-US" sz="1400" dirty="0">
+                <a:latin typeface="Consolas" panose="020B0609020204030204" pitchFamily="49" charset="0"/>
+              </a:rPr>
+              <a:t>    {</a:t>
+            </a:r>
+          </a:p>
+          <a:p>
+            <a:pPr marL="0" indent="0">
+              <a:buNone/>
+            </a:pPr>
+            <a:r>
+              <a:rPr lang="en-US" sz="1400" dirty="0">
                 <a:solidFill>
                   <a:srgbClr val="FF0000"/>
                 </a:solidFill>
                 <a:latin typeface="Consolas" panose="020B0609020204030204" pitchFamily="49" charset="0"/>
               </a:rPr>
-              <a:t>???</a:t>
+              <a:t>        ???</a:t>
             </a:r>
           </a:p>
           <a:p>
@@ -9899,7 +10242,18 @@
               <a:buNone/>
             </a:pPr>
             <a:r>
-              <a:rPr lang="en-US" sz="1800" dirty="0">
+              <a:rPr lang="en-US" sz="1400" dirty="0">
+                <a:latin typeface="Consolas" panose="020B0609020204030204" pitchFamily="49" charset="0"/>
+              </a:rPr>
+              <a:t>    }</a:t>
+            </a:r>
+          </a:p>
+          <a:p>
+            <a:pPr marL="0" indent="0">
+              <a:buNone/>
+            </a:pPr>
+            <a:r>
+              <a:rPr lang="en-US" sz="1400" dirty="0">
                 <a:latin typeface="Consolas" panose="020B0609020204030204" pitchFamily="49" charset="0"/>
               </a:rPr>
               <a:t>}</a:t>
@@ -9910,10 +10264,10 @@
               <a:buNone/>
             </a:pPr>
             <a:r>
-              <a:rPr lang="en-US" sz="1800" dirty="0">
-                <a:latin typeface="Consolas" panose="020B0609020204030204" pitchFamily="49" charset="0"/>
-              </a:rPr>
-              <a:t>else if (2) {</a:t>
+              <a:rPr lang="en-US" sz="1400" dirty="0">
+                <a:latin typeface="Consolas" panose="020B0609020204030204" pitchFamily="49" charset="0"/>
+              </a:rPr>
+              <a:t>else if (2)</a:t>
             </a:r>
           </a:p>
           <a:p>
@@ -9921,22 +10275,19 @@
               <a:buNone/>
             </a:pPr>
             <a:r>
-              <a:rPr lang="en-US" sz="1800" dirty="0">
-                <a:latin typeface="Consolas" panose="020B0609020204030204" pitchFamily="49" charset="0"/>
-              </a:rPr>
-              <a:t>    . . .</a:t>
+              <a:rPr lang="en-US" sz="1400" dirty="0">
+                <a:latin typeface="Consolas" panose="020B0609020204030204" pitchFamily="49" charset="0"/>
+              </a:rPr>
+              <a:t>{</a:t>
             </a:r>
           </a:p>
           <a:p>
             <a:pPr marL="0" indent="0">
               <a:buNone/>
             </a:pPr>
-            <a:r>
-              <a:rPr lang="en-US" sz="1800" dirty="0">
-                <a:latin typeface="Consolas" panose="020B0609020204030204" pitchFamily="49" charset="0"/>
-              </a:rPr>
-              <a:t>}</a:t>
-            </a:r>
+            <a:endParaRPr lang="en-US" sz="1400" dirty="0">
+              <a:latin typeface="Consolas" panose="020B0609020204030204" pitchFamily="49" charset="0"/>
+            </a:endParaRPr>
           </a:p>
         </p:txBody>
       </p:sp>
@@ -10675,10 +11026,10 @@
       </p:sp>
       <p:sp>
         <p:nvSpPr>
-          <p:cNvPr id="4" name="Arrow: Left 3">
-            <a:extLst>
-              <a:ext uri="{FF2B5EF4-FFF2-40B4-BE49-F238E27FC236}">
-                <a16:creationId xmlns:a16="http://schemas.microsoft.com/office/drawing/2014/main" id="{A6FFE67B-DCEC-452E-9572-D4800CEFE9C3}"/>
+          <p:cNvPr id="11" name="Rectangle 10">
+            <a:extLst>
+              <a:ext uri="{FF2B5EF4-FFF2-40B4-BE49-F238E27FC236}">
+                <a16:creationId xmlns:a16="http://schemas.microsoft.com/office/drawing/2014/main" id="{20055DD4-067B-45C8-BF77-E8D26336E32A}"/>
               </a:ext>
             </a:extLst>
           </p:cNvPr>
@@ -10687,24 +11038,24 @@
         </p:nvSpPr>
         <p:spPr>
           <a:xfrm>
-            <a:off x="3313786" y="2567635"/>
-            <a:ext cx="2194560" cy="1594714"/>
+            <a:off x="902526" y="2616280"/>
+            <a:ext cx="2632737" cy="2923205"/>
           </a:xfrm>
-          <a:prstGeom prst="leftArrow">
+          <a:prstGeom prst="rect">
             <a:avLst/>
           </a:prstGeom>
         </p:spPr>
         <p:style>
           <a:lnRef idx="2">
-            <a:schemeClr val="accent1">
+            <a:schemeClr val="accent2">
               <a:shade val="50000"/>
             </a:schemeClr>
           </a:lnRef>
           <a:fillRef idx="1">
-            <a:schemeClr val="accent1"/>
+            <a:schemeClr val="accent2"/>
           </a:fillRef>
           <a:effectRef idx="0">
-            <a:schemeClr val="accent1"/>
+            <a:schemeClr val="accent2"/>
           </a:effectRef>
           <a:fontRef idx="minor">
             <a:schemeClr val="lt1"/>
@@ -10714,27 +11065,42 @@
           <a:bodyPr rtlCol="0" anchor="ctr"/>
           <a:lstStyle/>
           <a:p>
-            <a:pPr algn="ctr"/>
-            <a:r>
-              <a:rPr lang="en-US" dirty="0"/>
-              <a:t>Pseudo code</a:t>
+            <a:r>
+              <a:rPr lang="en-US" sz="1400" dirty="0"/>
+              <a:t>This approach works best if the diagram is a tree.</a:t>
+            </a:r>
+          </a:p>
+          <a:p>
+            <a:endParaRPr lang="en-US" sz="1400" dirty="0"/>
+          </a:p>
+          <a:p>
+            <a:r>
+              <a:rPr lang="en-US" sz="1400" dirty="0"/>
+              <a:t>This means each node has only one node that points to it (its parent), and no node points to the root.</a:t>
+            </a:r>
+          </a:p>
+          <a:p>
+            <a:endParaRPr lang="en-US" sz="1400" dirty="0"/>
+          </a:p>
+          <a:p>
+            <a:r>
+              <a:rPr lang="en-US" sz="1400" dirty="0"/>
+              <a:t>It follows that there is only one path to each point in the story, and no loops or cycles.</a:t>
             </a:r>
           </a:p>
         </p:txBody>
       </p:sp>
       <p:cxnSp>
         <p:nvCxnSpPr>
-          <p:cNvPr id="13" name="Connector: Curved 12">
-            <a:extLst>
-              <a:ext uri="{FF2B5EF4-FFF2-40B4-BE49-F238E27FC236}">
-                <a16:creationId xmlns:a16="http://schemas.microsoft.com/office/drawing/2014/main" id="{154D5A5A-2FE3-4C31-B6A9-5D0F004F2262}"/>
+          <p:cNvPr id="22" name="Connector: Curved 21">
+            <a:extLst>
+              <a:ext uri="{FF2B5EF4-FFF2-40B4-BE49-F238E27FC236}">
+                <a16:creationId xmlns:a16="http://schemas.microsoft.com/office/drawing/2014/main" id="{A9FF1176-66FA-4EF4-9AE5-FF4BAB270E8B}"/>
               </a:ext>
             </a:extLst>
           </p:cNvPr>
           <p:cNvCxnSpPr>
             <a:cxnSpLocks/>
-            <a:stCxn id="6" idx="3"/>
-            <a:endCxn id="5" idx="2"/>
           </p:cNvCxnSpPr>
           <p:nvPr/>
         </p:nvCxnSpPr>
@@ -10770,10 +11136,10 @@
       </p:cxnSp>
       <p:sp>
         <p:nvSpPr>
-          <p:cNvPr id="29" name="TextBox 28">
-            <a:extLst>
-              <a:ext uri="{FF2B5EF4-FFF2-40B4-BE49-F238E27FC236}">
-                <a16:creationId xmlns:a16="http://schemas.microsoft.com/office/drawing/2014/main" id="{8F8776FF-EA7B-4D3D-876E-4EA4008FD67E}"/>
+          <p:cNvPr id="24" name="TextBox 23">
+            <a:extLst>
+              <a:ext uri="{FF2B5EF4-FFF2-40B4-BE49-F238E27FC236}">
+                <a16:creationId xmlns:a16="http://schemas.microsoft.com/office/drawing/2014/main" id="{F12ACA1F-CC3B-4717-A88A-B0A7F03F1EE4}"/>
               </a:ext>
             </a:extLst>
           </p:cNvPr>
@@ -10806,7 +11172,7 @@
     </p:spTree>
     <p:extLst>
       <p:ext uri="{BB962C8B-B14F-4D97-AF65-F5344CB8AC3E}">
-        <p14:creationId xmlns:p14="http://schemas.microsoft.com/office/powerpoint/2010/main" val="2520226927"/>
+        <p14:creationId xmlns:p14="http://schemas.microsoft.com/office/powerpoint/2010/main" val="1923724484"/>
       </p:ext>
     </p:extLst>
   </p:cSld>
@@ -10856,7 +11222,7 @@
           <a:p>
             <a:r>
               <a:rPr lang="en-US" dirty="0"/>
-              <a:t>Another approach: finite state machine</a:t>
+              <a:t>Another approach</a:t>
             </a:r>
           </a:p>
         </p:txBody>
@@ -10880,9 +11246,59 @@
         <p:spPr/>
         <p:txBody>
           <a:bodyPr>
-            <a:normAutofit fontScale="92500" lnSpcReduction="10000"/>
+            <a:normAutofit fontScale="70000" lnSpcReduction="20000"/>
           </a:bodyPr>
           <a:lstStyle/>
+          <a:p>
+            <a:r>
+              <a:rPr lang="en-US" dirty="0"/>
+              <a:t>Finite state machine (FSM)</a:t>
+            </a:r>
+          </a:p>
+          <a:p>
+            <a:pPr lvl="1"/>
+            <a:r>
+              <a:rPr lang="en-US" dirty="0"/>
+              <a:t>Each circle represents a possible state</a:t>
+            </a:r>
+          </a:p>
+          <a:p>
+            <a:pPr lvl="1"/>
+            <a:r>
+              <a:rPr lang="en-US" dirty="0"/>
+              <a:t>Each arrow is a possible state transition</a:t>
+            </a:r>
+          </a:p>
+          <a:p>
+            <a:pPr lvl="1"/>
+            <a:r>
+              <a:rPr lang="en-US" dirty="0"/>
+              <a:t>The state of the FSM at a given time consists </a:t>
+            </a:r>
+            <a:r>
+              <a:rPr lang="en-US" i="1" dirty="0"/>
+              <a:t>solely </a:t>
+            </a:r>
+            <a:r>
+              <a:rPr lang="en-US" dirty="0"/>
+              <a:t>of which circle you are on</a:t>
+            </a:r>
+          </a:p>
+          <a:p>
+            <a:pPr lvl="1"/>
+            <a:r>
+              <a:rPr lang="en-US" dirty="0"/>
+              <a:t>There are a limited number of pre-defined circles and arrows, hence </a:t>
+            </a:r>
+            <a:r>
+              <a:rPr lang="en-US" i="1" dirty="0"/>
+              <a:t>finite </a:t>
+            </a:r>
+            <a:r>
+              <a:rPr lang="en-US" dirty="0"/>
+              <a:t>state machine</a:t>
+            </a:r>
+          </a:p>
           <a:p>
             <a:r>
               <a:rPr lang="en-US" dirty="0"/>
@@ -10892,60 +11308,62 @@
               <a:rPr lang="en-US" dirty="0">
                 <a:hlinkClick r:id="rId3" action="ppaction://hlinkfile"/>
               </a:rPr>
-              <a:t>haunted house example</a:t>
+              <a:t>haunted house</a:t>
             </a:r>
             <a:r>
               <a:rPr lang="en-US" dirty="0"/>
-              <a:t> can be thought of as a FSM</a:t>
-            </a:r>
-          </a:p>
-          <a:p>
+              <a:t> story can be a FSM</a:t>
+            </a:r>
+          </a:p>
+          <a:p>
+            <a:pPr lvl="1"/>
             <a:r>
               <a:rPr lang="en-US" dirty="0"/>
-              <a:t>Each HTML page represents one possible “state” of the story, and hyperlinks represent transitions between states</a:t>
-            </a:r>
-          </a:p>
-          <a:p>
+              <a:t>Circles are HTML pages</a:t>
+            </a:r>
+          </a:p>
+          <a:p>
+            <a:pPr lvl="1"/>
             <a:r>
               <a:rPr lang="en-US" dirty="0"/>
-              <a:t>There are a limited number of pages, hence </a:t>
+              <a:t>Arrows are links</a:t>
+            </a:r>
+          </a:p>
+          <a:p>
+            <a:r>
+              <a:rPr lang="en-US" dirty="0"/>
+              <a:t>A text adventure game like </a:t>
+            </a:r>
+            <a:r>
+              <a:rPr lang="en-US" dirty="0" err="1"/>
+              <a:t>Zork</a:t>
+            </a:r>
+            <a:r>
+              <a:rPr lang="en-US" dirty="0"/>
+              <a:t> is not a FSM</a:t>
+            </a:r>
+          </a:p>
+          <a:p>
+            <a:pPr lvl="1"/>
+            <a:r>
+              <a:rPr lang="en-US" dirty="0"/>
+              <a:t>The state of the game is the </a:t>
             </a:r>
             <a:r>
               <a:rPr lang="en-US" i="1" dirty="0"/>
-              <a:t>finite </a:t>
+              <a:t>combination</a:t>
             </a:r>
             <a:r>
               <a:rPr lang="en-US" dirty="0"/>
-              <a:t>state machine</a:t>
-            </a:r>
-          </a:p>
-          <a:p>
-            <a:pPr marL="457200" lvl="1" indent="0">
-              <a:buNone/>
-            </a:pPr>
-            <a:r>
-              <a:rPr lang="en-US" sz="2200" i="1" dirty="0"/>
-              <a:t>In contrast, the state of a text adventure game like </a:t>
-            </a:r>
-            <a:r>
-              <a:rPr lang="en-US" sz="2200" i="1" dirty="0" err="1"/>
-              <a:t>Zork</a:t>
-            </a:r>
-            <a:r>
-              <a:rPr lang="en-US" sz="2200" i="1" dirty="0"/>
-              <a:t> includes many independent variables: items you’ve collected, doors you’ve unlocked, etc., so </a:t>
-            </a:r>
-            <a:r>
-              <a:rPr lang="en-US" sz="2200" i="1" dirty="0" err="1"/>
-              <a:t>Zork</a:t>
-            </a:r>
-            <a:r>
-              <a:rPr lang="en-US" sz="2200" i="1" dirty="0"/>
-              <a:t> could not be implemented as a FSM.</a:t>
-            </a:r>
-          </a:p>
-          <a:p>
-            <a:endParaRPr lang="en-US" dirty="0"/>
+              <a:t> of many variables</a:t>
+            </a:r>
+          </a:p>
+          <a:p>
+            <a:pPr lvl="1"/>
+            <a:r>
+              <a:rPr lang="en-US" dirty="0"/>
+              <a:t>Items you’ve collected, doors you’ve unlocked, monsters you’ve killed, etc.</a:t>
+            </a:r>
           </a:p>
         </p:txBody>
       </p:sp>
@@ -11875,7 +12293,13 @@
           <a:p>
             <a:r>
               <a:rPr lang="en-US" dirty="0"/>
-              <a:t>FSMs are often implemented using a table-based approach:</a:t>
+              <a:t>FSMs can be implemented a variety of ways</a:t>
+            </a:r>
+          </a:p>
+          <a:p>
+            <a:r>
+              <a:rPr lang="en-US" dirty="0"/>
+              <a:t>Example: a table-based approach:</a:t>
             </a:r>
           </a:p>
           <a:p>
@@ -12126,12 +12550,14 @@
         </p:nvSpPr>
         <p:spPr/>
         <p:txBody>
-          <a:bodyPr/>
+          <a:bodyPr>
+            <a:normAutofit/>
+          </a:bodyPr>
           <a:lstStyle/>
           <a:p>
             <a:r>
               <a:rPr lang="en-US" dirty="0"/>
-              <a:t>Main method</a:t>
+              <a:t>Overall program flow (i.e., the Main method)</a:t>
             </a:r>
           </a:p>
           <a:p>
@@ -12141,7 +12567,7 @@
             </a:pPr>
             <a:r>
               <a:rPr lang="en-US" dirty="0"/>
-              <a:t>Creates all the Page objects</a:t>
+              <a:t>Create all the Page objects and links</a:t>
             </a:r>
           </a:p>
           <a:p>
@@ -12151,7 +12577,7 @@
             </a:pPr>
             <a:r>
               <a:rPr lang="en-US" dirty="0"/>
-              <a:t>Adds links between Page objects</a:t>
+              <a:t>Initialize the current page to the story’s starting page</a:t>
             </a:r>
           </a:p>
           <a:p>
@@ -12161,7 +12587,55 @@
             </a:pPr>
             <a:r>
               <a:rPr lang="en-US" dirty="0"/>
-              <a:t>Initializes the current page to the story’s starting page</a:t>
+              <a:t>Enter a </a:t>
+            </a:r>
+            <a:r>
+              <a:rPr lang="en-US" i="1" dirty="0"/>
+              <a:t>while </a:t>
+            </a:r>
+            <a:r>
+              <a:rPr lang="en-US" dirty="0"/>
+              <a:t>loop, which:</a:t>
+            </a:r>
+          </a:p>
+          <a:p>
+            <a:pPr marL="1371600" lvl="2" indent="-457200">
+              <a:buFont typeface="+mj-lt"/>
+              <a:buAutoNum type="arabicPeriod"/>
+            </a:pPr>
+            <a:r>
+              <a:rPr lang="en-US" dirty="0"/>
+              <a:t>Outputs the current page’s description</a:t>
+            </a:r>
+          </a:p>
+          <a:p>
+            <a:pPr marL="1371600" lvl="2" indent="-457200">
+              <a:buFont typeface="+mj-lt"/>
+              <a:buAutoNum type="arabicPeriod"/>
+            </a:pPr>
+            <a:r>
+              <a:rPr lang="en-US" dirty="0"/>
+              <a:t>Outputs the menu of choices (i.e., links)</a:t>
+            </a:r>
+          </a:p>
+          <a:p>
+            <a:pPr marL="1371600" lvl="2" indent="-457200">
+              <a:buFont typeface="+mj-lt"/>
+              <a:buAutoNum type="arabicPeriod"/>
+            </a:pPr>
+            <a:r>
+              <a:rPr lang="en-US" dirty="0"/>
+              <a:t>Read keyboard input to determine the user’s selected link</a:t>
+            </a:r>
+          </a:p>
+          <a:p>
+            <a:pPr marL="1371600" lvl="2" indent="-457200">
+              <a:buFont typeface="+mj-lt"/>
+              <a:buAutoNum type="arabicPeriod"/>
+            </a:pPr>
+            <a:r>
+              <a:rPr lang="en-US" dirty="0"/>
+              <a:t>Set the current page to the selected link’s destination</a:t>
             </a:r>
           </a:p>
           <a:p>
@@ -12171,7 +12645,7 @@
             </a:pPr>
             <a:r>
               <a:rPr lang="en-US" dirty="0"/>
-              <a:t>Enters a </a:t>
+              <a:t>Fall out of the </a:t>
             </a:r>
             <a:r>
               <a:rPr lang="en-US" i="1" dirty="0"/>
@@ -12179,7 +12653,7 @@
             </a:r>
             <a:r>
               <a:rPr lang="en-US" dirty="0"/>
-              <a:t>loop which repeats as long as there are choices</a:t>
+              <a:t>loop when we reach a page with no links</a:t>
             </a:r>
           </a:p>
           <a:p>
@@ -12189,48 +12663,8 @@
             </a:pPr>
             <a:r>
               <a:rPr lang="en-US" dirty="0"/>
-              <a:t>After exiting the while loop, output the ending page’s description</a:t>
-            </a:r>
-          </a:p>
-          <a:p>
-            <a:r>
-              <a:rPr lang="en-US" dirty="0"/>
-              <a:t>In the body of the while loop</a:t>
-            </a:r>
-          </a:p>
-          <a:p>
-            <a:pPr marL="914400" lvl="1" indent="-457200">
-              <a:buFont typeface="+mj-lt"/>
-              <a:buAutoNum type="arabicPeriod"/>
-            </a:pPr>
-            <a:r>
-              <a:rPr lang="en-US" dirty="0"/>
-              <a:t>Output the current page description</a:t>
-            </a:r>
-          </a:p>
-          <a:p>
-            <a:pPr marL="914400" lvl="1" indent="-457200">
-              <a:buFont typeface="+mj-lt"/>
-              <a:buAutoNum type="arabicPeriod"/>
-            </a:pPr>
-            <a:r>
-              <a:rPr lang="en-US" dirty="0"/>
-              <a:t>Output the menu of choices (i.e., links)</a:t>
-            </a:r>
-          </a:p>
-          <a:p>
-            <a:pPr marL="914400" lvl="1" indent="-457200">
-              <a:buFont typeface="+mj-lt"/>
-              <a:buAutoNum type="arabicPeriod"/>
-            </a:pPr>
-            <a:r>
-              <a:rPr lang="en-US" dirty="0"/>
-              <a:t>Set the current page to the next page based on keyboard input</a:t>
-            </a:r>
-          </a:p>
-          <a:p>
-            <a:pPr lvl="1"/>
-            <a:endParaRPr lang="en-US" dirty="0"/>
+              <a:t>Output the final page’s description and exit the program</a:t>
+            </a:r>
           </a:p>
           <a:p>
             <a:pPr marL="457200" lvl="1" indent="0">

</xml_diff>